<commit_message>
added several linux commands
</commit_message>
<xml_diff>
--- a/week02/Lab02.pptx
+++ b/week02/Lab02.pptx
@@ -5023,11 +5023,18 @@
           </a:p>
           <a:p>
             <a:r>
+              <a:rPr lang="en-US" altLang="zh-CN" sz="1400" b="0">
+                <a:effectLst/>
+                <a:latin typeface="Consolas" panose="020B0609020204030204" pitchFamily="49" charset="0"/>
+              </a:rPr>
+              <a:t>    signed char </a:t>
+            </a:r>
+            <a:r>
               <a:rPr lang="en-US" altLang="zh-CN" sz="1400" b="0" dirty="0">
                 <a:effectLst/>
                 <a:latin typeface="Consolas" panose="020B0609020204030204" pitchFamily="49" charset="0"/>
               </a:rPr>
-              <a:t>    char a = 127;</a:t>
+              <a:t>a = 127;</a:t>
             </a:r>
           </a:p>
           <a:p>

</xml_diff>